<commit_message>
Akshay slides, final changes.
</commit_message>
<xml_diff>
--- a/doc/slides/ML Subteam.pptx
+++ b/doc/slides/ML Subteam.pptx
@@ -3865,29 +3865,6 @@
               <a:buNone/>
             </a:pPr>
             <a:r>
-              <a:rPr lang="en-US" sz="1100" dirty="0">
-                <a:solidFill>
-                  <a:schemeClr val="dk1"/>
-                </a:solidFill>
-                <a:latin typeface="Encode Sans"/>
-                <a:ea typeface="Encode Sans"/>
-                <a:cs typeface="Encode Sans"/>
-                <a:sym typeface="Encode Sans"/>
-              </a:rPr>
-              <a:t>	4.	Send output back to Jetson Nano</a:t>
-            </a:r>
-          </a:p>
-          <a:p>
-            <a:pPr marL="0" lvl="0" indent="0" algn="l" rtl="0">
-              <a:spcBef>
-                <a:spcPts val="480"/>
-              </a:spcBef>
-              <a:spcAft>
-                <a:spcPts val="0"/>
-              </a:spcAft>
-              <a:buNone/>
-            </a:pPr>
-            <a:r>
               <a:rPr lang="en-US" sz="1500" dirty="0">
                 <a:solidFill>
                   <a:schemeClr val="dk1"/>
@@ -4125,7 +4102,7 @@
               <a:buNone/>
             </a:pPr>
             <a:r>
-              <a:rPr lang="en-US" dirty="0"/>
+              <a:rPr lang="en-US"/>
               <a:t>Machine Learning</a:t>
             </a:r>
             <a:endParaRPr dirty="0"/>

</xml_diff>